<commit_message>
Update Oefenzittingen 2 en 3
</commit_message>
<xml_diff>
--- a/Oefenzitting 2.pptx
+++ b/Oefenzitting 2.pptx
@@ -273,7 +273,7 @@
           <a:p>
             <a:fld id="{92C78489-0109-4234-B997-5BF3D8763553}" type="datetimeFigureOut">
               <a:rPr lang="en-GB" smtClean="0"/>
-              <a:t>16/10/2025</a:t>
+              <a:t>13/11/2025</a:t>
             </a:fld>
             <a:endParaRPr lang="en-GB"/>
           </a:p>
@@ -473,7 +473,7 @@
           <a:p>
             <a:fld id="{92C78489-0109-4234-B997-5BF3D8763553}" type="datetimeFigureOut">
               <a:rPr lang="en-GB" smtClean="0"/>
-              <a:t>16/10/2025</a:t>
+              <a:t>13/11/2025</a:t>
             </a:fld>
             <a:endParaRPr lang="en-GB"/>
           </a:p>
@@ -683,7 +683,7 @@
           <a:p>
             <a:fld id="{92C78489-0109-4234-B997-5BF3D8763553}" type="datetimeFigureOut">
               <a:rPr lang="en-GB" smtClean="0"/>
-              <a:t>16/10/2025</a:t>
+              <a:t>13/11/2025</a:t>
             </a:fld>
             <a:endParaRPr lang="en-GB"/>
           </a:p>
@@ -883,7 +883,7 @@
           <a:p>
             <a:fld id="{92C78489-0109-4234-B997-5BF3D8763553}" type="datetimeFigureOut">
               <a:rPr lang="en-GB" smtClean="0"/>
-              <a:t>16/10/2025</a:t>
+              <a:t>13/11/2025</a:t>
             </a:fld>
             <a:endParaRPr lang="en-GB"/>
           </a:p>
@@ -1159,7 +1159,7 @@
           <a:p>
             <a:fld id="{92C78489-0109-4234-B997-5BF3D8763553}" type="datetimeFigureOut">
               <a:rPr lang="en-GB" smtClean="0"/>
-              <a:t>16/10/2025</a:t>
+              <a:t>13/11/2025</a:t>
             </a:fld>
             <a:endParaRPr lang="en-GB"/>
           </a:p>
@@ -1427,7 +1427,7 @@
           <a:p>
             <a:fld id="{92C78489-0109-4234-B997-5BF3D8763553}" type="datetimeFigureOut">
               <a:rPr lang="en-GB" smtClean="0"/>
-              <a:t>16/10/2025</a:t>
+              <a:t>13/11/2025</a:t>
             </a:fld>
             <a:endParaRPr lang="en-GB"/>
           </a:p>
@@ -1842,7 +1842,7 @@
           <a:p>
             <a:fld id="{92C78489-0109-4234-B997-5BF3D8763553}" type="datetimeFigureOut">
               <a:rPr lang="en-GB" smtClean="0"/>
-              <a:t>16/10/2025</a:t>
+              <a:t>13/11/2025</a:t>
             </a:fld>
             <a:endParaRPr lang="en-GB"/>
           </a:p>
@@ -1984,7 +1984,7 @@
           <a:p>
             <a:fld id="{92C78489-0109-4234-B997-5BF3D8763553}" type="datetimeFigureOut">
               <a:rPr lang="en-GB" smtClean="0"/>
-              <a:t>16/10/2025</a:t>
+              <a:t>13/11/2025</a:t>
             </a:fld>
             <a:endParaRPr lang="en-GB"/>
           </a:p>
@@ -2097,7 +2097,7 @@
           <a:p>
             <a:fld id="{92C78489-0109-4234-B997-5BF3D8763553}" type="datetimeFigureOut">
               <a:rPr lang="en-GB" smtClean="0"/>
-              <a:t>16/10/2025</a:t>
+              <a:t>13/11/2025</a:t>
             </a:fld>
             <a:endParaRPr lang="en-GB"/>
           </a:p>
@@ -2410,7 +2410,7 @@
           <a:p>
             <a:fld id="{92C78489-0109-4234-B997-5BF3D8763553}" type="datetimeFigureOut">
               <a:rPr lang="en-GB" smtClean="0"/>
-              <a:t>16/10/2025</a:t>
+              <a:t>13/11/2025</a:t>
             </a:fld>
             <a:endParaRPr lang="en-GB"/>
           </a:p>
@@ -2699,7 +2699,7 @@
           <a:p>
             <a:fld id="{92C78489-0109-4234-B997-5BF3D8763553}" type="datetimeFigureOut">
               <a:rPr lang="en-GB" smtClean="0"/>
-              <a:t>16/10/2025</a:t>
+              <a:t>13/11/2025</a:t>
             </a:fld>
             <a:endParaRPr lang="en-GB"/>
           </a:p>
@@ -2942,7 +2942,7 @@
           <a:p>
             <a:fld id="{92C78489-0109-4234-B997-5BF3D8763553}" type="datetimeFigureOut">
               <a:rPr lang="en-GB" smtClean="0"/>
-              <a:t>16/10/2025</a:t>
+              <a:t>13/11/2025</a:t>
             </a:fld>
             <a:endParaRPr lang="en-GB"/>
           </a:p>
@@ -5428,8 +5428,8 @@
           </a:p>
         </p:txBody>
       </p:sp>
-      <mc:AlternateContent xmlns:mc="http://schemas.openxmlformats.org/markup-compatibility/2006">
-        <mc:Choice xmlns:a14="http://schemas.microsoft.com/office/drawing/2010/main" Requires="a14">
+      <mc:AlternateContent xmlns:mc="http://schemas.openxmlformats.org/markup-compatibility/2006" xmlns:a14="http://schemas.microsoft.com/office/drawing/2010/main">
+        <mc:Choice Requires="a14">
           <p:sp>
             <p:nvSpPr>
               <p:cNvPr id="3" name="Tijdelijke aanduiding voor inhoud 2">
@@ -5629,7 +5629,7 @@
             </p:txBody>
           </p:sp>
         </mc:Choice>
-        <mc:Fallback>
+        <mc:Fallback xmlns="">
           <p:sp>
             <p:nvSpPr>
               <p:cNvPr id="3" name="Tijdelijke aanduiding voor inhoud 2">
@@ -9698,8 +9698,8 @@
           </a:p>
         </p:txBody>
       </p:sp>
-      <mc:AlternateContent xmlns:mc="http://schemas.openxmlformats.org/markup-compatibility/2006">
-        <mc:Choice xmlns:a14="http://schemas.microsoft.com/office/drawing/2010/main" Requires="a14">
+      <mc:AlternateContent xmlns:mc="http://schemas.openxmlformats.org/markup-compatibility/2006" xmlns:a14="http://schemas.microsoft.com/office/drawing/2010/main">
+        <mc:Choice Requires="a14">
           <p:sp>
             <p:nvSpPr>
               <p:cNvPr id="3" name="Tijdelijke aanduiding voor inhoud 2">
@@ -10151,7 +10151,7 @@
             </p:txBody>
           </p:sp>
         </mc:Choice>
-        <mc:Fallback>
+        <mc:Fallback xmlns="">
           <p:sp>
             <p:nvSpPr>
               <p:cNvPr id="3" name="Tijdelijke aanduiding voor inhoud 2">

</xml_diff>